<commit_message>
summary slides, file cleanup.
</commit_message>
<xml_diff>
--- a/Summary/20220202_microbiome_demographic_slides.pptx
+++ b/Summary/20220202_microbiome_demographic_slides.pptx
@@ -4169,7 +4169,7 @@
           <a:lstStyle/>
           <a:p>
             <a:r>
-              <a:rPr lang="en-US" dirty="0">
+              <a:rPr lang="en-US">
                 <a:solidFill>
                   <a:schemeClr val="tx1">
                     <a:lumMod val="50000"/>
@@ -4184,7 +4184,7 @@
           </a:p>
           <a:p>
             <a:r>
-              <a:rPr lang="en-US" dirty="0">
+              <a:rPr lang="en-US">
                 <a:solidFill>
                   <a:schemeClr val="tx1">
                     <a:lumMod val="50000"/>
@@ -4199,7 +4199,7 @@
           </a:p>
           <a:p>
             <a:r>
-              <a:rPr lang="en-US" dirty="0">
+              <a:rPr lang="en-US">
                 <a:solidFill>
                   <a:schemeClr val="tx1">
                     <a:lumMod val="50000"/>
@@ -4266,7 +4266,7 @@
           <a:lstStyle/>
           <a:p>
             <a:r>
-              <a:rPr lang="en-US" dirty="0">
+              <a:rPr lang="en-US">
                 <a:latin typeface="Yu Gothic" panose="020B0400000000000000" pitchFamily="34" charset="-128"/>
                 <a:ea typeface="Yu Gothic" panose="020B0400000000000000" pitchFamily="34" charset="-128"/>
               </a:rPr>
@@ -4299,7 +4299,7 @@
           <a:lstStyle/>
           <a:p>
             <a:r>
-              <a:rPr lang="en-US" dirty="0">
+              <a:rPr lang="en-US">
                 <a:latin typeface="Yu Gothic" panose="020B0400000000000000" pitchFamily="34" charset="-128"/>
                 <a:ea typeface="Yu Gothic" panose="020B0400000000000000" pitchFamily="34" charset="-128"/>
               </a:rPr>
@@ -4309,7 +4309,7 @@
           <a:p>
             <a:pPr lvl="1"/>
             <a:r>
-              <a:rPr lang="en-US" dirty="0">
+              <a:rPr lang="en-US">
                 <a:latin typeface="Yu Gothic" panose="020B0400000000000000" pitchFamily="34" charset="-128"/>
                 <a:ea typeface="Yu Gothic" panose="020B0400000000000000" pitchFamily="34" charset="-128"/>
               </a:rPr>
@@ -4317,7 +4317,7 @@
             </a:r>
           </a:p>
           <a:p>
-            <a:endParaRPr lang="en-US" dirty="0">
+            <a:endParaRPr lang="en-US">
               <a:latin typeface="Yu Gothic" panose="020B0400000000000000" pitchFamily="34" charset="-128"/>
               <a:ea typeface="Yu Gothic" panose="020B0400000000000000" pitchFamily="34" charset="-128"/>
             </a:endParaRPr>
@@ -4376,7 +4376,7 @@
           <a:lstStyle/>
           <a:p>
             <a:r>
-              <a:rPr lang="en-US" dirty="0">
+              <a:rPr lang="en-US">
                 <a:latin typeface="Yu Gothic" panose="020B0400000000000000" pitchFamily="34" charset="-128"/>
                 <a:ea typeface="Yu Gothic" panose="020B0400000000000000" pitchFamily="34" charset="-128"/>
               </a:rPr>
@@ -4409,7 +4409,7 @@
           <a:lstStyle/>
           <a:p>
             <a:r>
-              <a:rPr lang="en-US" dirty="0">
+              <a:rPr lang="en-US">
                 <a:latin typeface="Yu Gothic" panose="020B0400000000000000" pitchFamily="34" charset="-128"/>
                 <a:ea typeface="Yu Gothic" panose="020B0400000000000000" pitchFamily="34" charset="-128"/>
               </a:rPr>
@@ -4418,7 +4418,7 @@
           </a:p>
           <a:p>
             <a:r>
-              <a:rPr lang="en-US" dirty="0">
+              <a:rPr lang="en-US">
                 <a:latin typeface="Yu Gothic" panose="020B0400000000000000" pitchFamily="34" charset="-128"/>
                 <a:ea typeface="Yu Gothic" panose="020B0400000000000000" pitchFamily="34" charset="-128"/>
               </a:rPr>
@@ -4427,21 +4427,21 @@
           </a:p>
           <a:p>
             <a:r>
-              <a:rPr lang="en-US" dirty="0">
+              <a:rPr lang="en-US">
                 <a:latin typeface="Yu Gothic" panose="020B0400000000000000" pitchFamily="34" charset="-128"/>
                 <a:ea typeface="Yu Gothic" panose="020B0400000000000000" pitchFamily="34" charset="-128"/>
               </a:rPr>
               <a:t>I think that maybe looking a little more closely into </a:t>
             </a:r>
             <a:r>
-              <a:rPr lang="en-US" i="1" dirty="0">
+              <a:rPr lang="en-US" i="1">
                 <a:latin typeface="Yu Gothic" panose="020B0400000000000000" pitchFamily="34" charset="-128"/>
                 <a:ea typeface="Yu Gothic" panose="020B0400000000000000" pitchFamily="34" charset="-128"/>
               </a:rPr>
               <a:t>why only some species</a:t>
             </a:r>
             <a:r>
-              <a:rPr lang="en-US" dirty="0">
+              <a:rPr lang="en-US">
                 <a:latin typeface="Yu Gothic" panose="020B0400000000000000" pitchFamily="34" charset="-128"/>
                 <a:ea typeface="Yu Gothic" panose="020B0400000000000000" pitchFamily="34" charset="-128"/>
               </a:rPr>
@@ -4612,7 +4612,7 @@
                         <a:buNone/>
                       </a:pPr>
                       <a:r>
-                        <a:rPr lang="en-US" sz="1500" dirty="0">
+                        <a:rPr lang="en-US" sz="1500">
                           <a:solidFill>
                             <a:schemeClr val="accent1"/>
                           </a:solidFill>
@@ -4620,14 +4620,14 @@
                         <a:t>A. </a:t>
                       </a:r>
                       <a:r>
-                        <a:rPr lang="en-US" sz="1500" dirty="0" err="1">
+                        <a:rPr lang="en-US" sz="1500" err="1">
                           <a:solidFill>
                             <a:schemeClr val="accent1"/>
                           </a:solidFill>
                         </a:rPr>
                         <a:t>finegoldii</a:t>
                       </a:r>
-                      <a:endParaRPr lang="en-US" sz="1500" dirty="0">
+                      <a:endParaRPr lang="en-US" sz="1500">
                         <a:solidFill>
                           <a:schemeClr val="accent1"/>
                         </a:solidFill>
@@ -4646,7 +4646,7 @@
                         <a:buNone/>
                       </a:pPr>
                       <a:r>
-                        <a:rPr lang="en-US" sz="1500" dirty="0">
+                        <a:rPr lang="en-US" sz="1500">
                           <a:solidFill>
                             <a:schemeClr val="accent1"/>
                           </a:solidFill>
@@ -4654,14 +4654,14 @@
                         <a:t>A. </a:t>
                       </a:r>
                       <a:r>
-                        <a:rPr lang="en-US" sz="1500" dirty="0" err="1">
+                        <a:rPr lang="en-US" sz="1500" err="1">
                           <a:solidFill>
                             <a:schemeClr val="accent1"/>
                           </a:solidFill>
                         </a:rPr>
                         <a:t>muciniphila</a:t>
                       </a:r>
-                      <a:endParaRPr lang="en-US" sz="1500" dirty="0">
+                      <a:endParaRPr lang="en-US" sz="1500">
                         <a:solidFill>
                           <a:schemeClr val="accent1"/>
                         </a:solidFill>
@@ -4693,7 +4693,7 @@
                         <a:defRPr/>
                       </a:pPr>
                       <a:r>
-                        <a:rPr lang="en-US" sz="1400" dirty="0">
+                        <a:rPr lang="en-US" sz="1400">
                           <a:solidFill>
                             <a:schemeClr val="accent1"/>
                           </a:solidFill>
@@ -4703,7 +4703,7 @@
                         <a:t>A. </a:t>
                       </a:r>
                       <a:r>
-                        <a:rPr lang="en-US" sz="1400" dirty="0" err="1">
+                        <a:rPr lang="en-US" sz="1400" err="1">
                           <a:solidFill>
                             <a:schemeClr val="accent1"/>
                           </a:solidFill>
@@ -4712,7 +4712,7 @@
                         </a:rPr>
                         <a:t>onderdonkii</a:t>
                       </a:r>
-                      <a:endParaRPr lang="en-US" sz="1400" dirty="0">
+                      <a:endParaRPr lang="en-US" sz="1400">
                         <a:solidFill>
                           <a:schemeClr val="accent1"/>
                         </a:solidFill>
@@ -4746,7 +4746,7 @@
                         <a:defRPr/>
                       </a:pPr>
                       <a:r>
-                        <a:rPr lang="en-US" sz="1400" dirty="0">
+                        <a:rPr lang="en-US" sz="1400">
                           <a:solidFill>
                             <a:schemeClr val="bg1"/>
                           </a:solidFill>
@@ -4756,7 +4756,7 @@
                         <a:t>A. </a:t>
                       </a:r>
                       <a:r>
-                        <a:rPr lang="en-US" sz="1400" dirty="0" err="1">
+                        <a:rPr lang="en-US" sz="1400" err="1">
                           <a:solidFill>
                             <a:schemeClr val="bg1"/>
                           </a:solidFill>
@@ -4765,7 +4765,7 @@
                         </a:rPr>
                         <a:t>putredinis</a:t>
                       </a:r>
-                      <a:endParaRPr lang="en-US" sz="1400" dirty="0">
+                      <a:endParaRPr lang="en-US" sz="1400">
                         <a:solidFill>
                           <a:schemeClr val="bg1"/>
                         </a:solidFill>
@@ -4799,20 +4799,20 @@
                         <a:defRPr/>
                       </a:pPr>
                       <a:r>
-                        <a:rPr lang="en-US" sz="1400" dirty="0">
+                        <a:rPr lang="en-US" sz="1400">
                           <a:latin typeface="Yu Gothic" panose="020B0400000000000000" pitchFamily="34" charset="-128"/>
                           <a:ea typeface="Yu Gothic" panose="020B0400000000000000" pitchFamily="34" charset="-128"/>
                         </a:rPr>
                         <a:t>A. </a:t>
                       </a:r>
                       <a:r>
-                        <a:rPr lang="en-US" sz="1400" dirty="0" err="1">
+                        <a:rPr lang="en-US" sz="1400" err="1">
                           <a:latin typeface="Yu Gothic" panose="020B0400000000000000" pitchFamily="34" charset="-128"/>
                           <a:ea typeface="Yu Gothic" panose="020B0400000000000000" pitchFamily="34" charset="-128"/>
                         </a:rPr>
                         <a:t>shahii</a:t>
                       </a:r>
-                      <a:endParaRPr lang="en-US" sz="1400" dirty="0">
+                      <a:endParaRPr lang="en-US" sz="1400">
                         <a:latin typeface="Yu Gothic" panose="020B0400000000000000" pitchFamily="34" charset="-128"/>
                         <a:ea typeface="Yu Gothic" panose="020B0400000000000000" pitchFamily="34" charset="-128"/>
                       </a:endParaRPr>
@@ -4833,7 +4833,7 @@
                     <a:lstStyle/>
                     <a:p>
                       <a:r>
-                        <a:rPr lang="en-US" sz="1400" dirty="0">
+                        <a:rPr lang="en-US" sz="1400">
                           <a:latin typeface="Yu Gothic" panose="020B0400000000000000" pitchFamily="34" charset="-128"/>
                           <a:ea typeface="Yu Gothic" panose="020B0400000000000000" pitchFamily="34" charset="-128"/>
                         </a:rPr>
@@ -4849,7 +4849,7 @@
                     <a:lstStyle/>
                     <a:p>
                       <a:r>
-                        <a:rPr lang="en-US" sz="1500" dirty="0">
+                        <a:rPr lang="en-US" sz="1500">
                           <a:solidFill>
                             <a:schemeClr val="accent1"/>
                           </a:solidFill>
@@ -4866,7 +4866,7 @@
                     <a:lstStyle/>
                     <a:p>
                       <a:r>
-                        <a:rPr lang="en-US" sz="1500" dirty="0">
+                        <a:rPr lang="en-US" sz="1500">
                           <a:solidFill>
                             <a:schemeClr val="accent1"/>
                           </a:solidFill>
@@ -4883,7 +4883,7 @@
                     <a:lstStyle/>
                     <a:p>
                       <a:r>
-                        <a:rPr lang="en-US" sz="1400" dirty="0">
+                        <a:rPr lang="en-US" sz="1400">
                           <a:solidFill>
                             <a:schemeClr val="accent1"/>
                           </a:solidFill>
@@ -4902,7 +4902,7 @@
                     <a:lstStyle/>
                     <a:p>
                       <a:r>
-                        <a:rPr lang="en-US" sz="1400" dirty="0">
+                        <a:rPr lang="en-US" sz="1400">
                           <a:solidFill>
                             <a:schemeClr val="tx1"/>
                           </a:solidFill>
@@ -4921,7 +4921,7 @@
                     <a:lstStyle/>
                     <a:p>
                       <a:r>
-                        <a:rPr lang="en-US" sz="1400" dirty="0">
+                        <a:rPr lang="en-US" sz="1400">
                           <a:latin typeface="Yu Gothic" panose="020B0400000000000000" pitchFamily="34" charset="-128"/>
                           <a:ea typeface="Yu Gothic" panose="020B0400000000000000" pitchFamily="34" charset="-128"/>
                         </a:rPr>
@@ -4960,7 +4960,7 @@
                     <a:lstStyle/>
                     <a:p>
                       <a:r>
-                        <a:rPr lang="en-US" sz="1500" dirty="0">
+                        <a:rPr lang="en-US" sz="1500">
                           <a:solidFill>
                             <a:schemeClr val="accent1"/>
                           </a:solidFill>
@@ -4977,7 +4977,7 @@
                     <a:lstStyle/>
                     <a:p>
                       <a:r>
-                        <a:rPr lang="en-US" sz="1500" dirty="0">
+                        <a:rPr lang="en-US" sz="1500">
                           <a:solidFill>
                             <a:schemeClr val="accent1"/>
                           </a:solidFill>
@@ -4994,7 +4994,7 @@
                     <a:lstStyle/>
                     <a:p>
                       <a:r>
-                        <a:rPr lang="en-US" sz="1400" dirty="0">
+                        <a:rPr lang="en-US" sz="1400">
                           <a:solidFill>
                             <a:schemeClr val="accent1"/>
                           </a:solidFill>
@@ -5013,7 +5013,7 @@
                     <a:lstStyle/>
                     <a:p>
                       <a:r>
-                        <a:rPr lang="en-US" sz="1400" dirty="0">
+                        <a:rPr lang="en-US" sz="1400">
                           <a:solidFill>
                             <a:schemeClr val="tx1"/>
                           </a:solidFill>
@@ -5032,7 +5032,7 @@
                     <a:lstStyle/>
                     <a:p>
                       <a:r>
-                        <a:rPr lang="en-US" sz="1400" dirty="0">
+                        <a:rPr lang="en-US" sz="1400">
                           <a:latin typeface="Yu Gothic" panose="020B0400000000000000" pitchFamily="34" charset="-128"/>
                           <a:ea typeface="Yu Gothic" panose="020B0400000000000000" pitchFamily="34" charset="-128"/>
                         </a:rPr>
@@ -5149,7 +5149,7 @@
                         <a:buNone/>
                       </a:pPr>
                       <a:r>
-                        <a:rPr lang="en-US" sz="1500" dirty="0">
+                        <a:rPr lang="en-US" sz="1500">
                           <a:solidFill>
                             <a:schemeClr val="accent1"/>
                           </a:solidFill>
@@ -5170,7 +5170,7 @@
                         <a:buNone/>
                       </a:pPr>
                       <a:r>
-                        <a:rPr lang="en-US" sz="1500" dirty="0">
+                        <a:rPr lang="en-US" sz="1500">
                           <a:solidFill>
                             <a:schemeClr val="accent6">
                               <a:lumMod val="75000"/>
@@ -5180,7 +5180,7 @@
                         <a:t>B. </a:t>
                       </a:r>
                       <a:r>
-                        <a:rPr lang="en-US" sz="1500" dirty="0" err="1">
+                        <a:rPr lang="en-US" sz="1500" err="1">
                           <a:solidFill>
                             <a:schemeClr val="accent6">
                               <a:lumMod val="75000"/>
@@ -5189,7 +5189,7 @@
                         </a:rPr>
                         <a:t>caccae</a:t>
                       </a:r>
-                      <a:endParaRPr lang="en-US" sz="1500" dirty="0">
+                      <a:endParaRPr lang="en-US" sz="1500">
                         <a:solidFill>
                           <a:schemeClr val="accent6">
                             <a:lumMod val="75000"/>
@@ -5209,14 +5209,14 @@
                         <a:buNone/>
                       </a:pPr>
                       <a:r>
-                        <a:rPr lang="en-US" sz="1500" dirty="0"/>
+                        <a:rPr lang="en-US" sz="1500"/>
                         <a:t>B. </a:t>
                       </a:r>
                       <a:r>
-                        <a:rPr lang="en-US" sz="1500" dirty="0" err="1"/>
+                        <a:rPr lang="en-US" sz="1500" err="1"/>
                         <a:t>cellulolyticus</a:t>
                       </a:r>
-                      <a:endParaRPr lang="en-US" sz="1500" dirty="0"/>
+                      <a:endParaRPr lang="en-US" sz="1500"/>
                     </a:p>
                   </a:txBody>
                   <a:tcPr/>
@@ -5230,7 +5230,7 @@
                         <a:buNone/>
                       </a:pPr>
                       <a:r>
-                        <a:rPr lang="en-US" sz="1500" dirty="0"/>
+                        <a:rPr lang="en-US" sz="1500"/>
                         <a:t>B. fragilis</a:t>
                       </a:r>
                     </a:p>
@@ -5247,7 +5247,7 @@
                         <a:buNone/>
                       </a:pPr>
                       <a:r>
-                        <a:rPr lang="en-US" sz="1500" dirty="0">
+                        <a:rPr lang="en-US" sz="1500">
                           <a:solidFill>
                             <a:schemeClr val="accent1"/>
                           </a:solidFill>
@@ -5255,14 +5255,14 @@
                         <a:t>B. </a:t>
                       </a:r>
                       <a:r>
-                        <a:rPr lang="en-US" sz="1500" dirty="0" err="1">
+                        <a:rPr lang="en-US" sz="1500" err="1">
                           <a:solidFill>
                             <a:schemeClr val="accent1"/>
                           </a:solidFill>
                         </a:rPr>
                         <a:t>intestinihominis</a:t>
                       </a:r>
-                      <a:endParaRPr lang="en-US" sz="1500" dirty="0">
+                      <a:endParaRPr lang="en-US" sz="1500">
                         <a:solidFill>
                           <a:schemeClr val="accent1"/>
                         </a:solidFill>
@@ -5284,7 +5284,7 @@
                     <a:lstStyle/>
                     <a:p>
                       <a:r>
-                        <a:rPr lang="en-US" sz="1500" dirty="0"/>
+                        <a:rPr lang="en-US" sz="1500"/>
                         <a:t>Multiple Epochs</a:t>
                       </a:r>
                     </a:p>
@@ -5297,7 +5297,7 @@
                     <a:lstStyle/>
                     <a:p>
                       <a:r>
-                        <a:rPr lang="en-US" sz="1500" dirty="0">
+                        <a:rPr lang="en-US" sz="1500">
                           <a:solidFill>
                             <a:schemeClr val="accent1"/>
                           </a:solidFill>
@@ -5314,7 +5314,7 @@
                     <a:lstStyle/>
                     <a:p>
                       <a:r>
-                        <a:rPr lang="en-US" sz="1500" dirty="0">
+                        <a:rPr lang="en-US" sz="1500">
                           <a:solidFill>
                             <a:schemeClr val="accent6">
                               <a:lumMod val="75000"/>
@@ -5333,7 +5333,7 @@
                     <a:lstStyle/>
                     <a:p>
                       <a:r>
-                        <a:rPr lang="en-US" sz="1500" dirty="0"/>
+                        <a:rPr lang="en-US" sz="1500"/>
                         <a:t>-1167.48967523</a:t>
                       </a:r>
                     </a:p>
@@ -5346,7 +5346,7 @@
                     <a:lstStyle/>
                     <a:p>
                       <a:r>
-                        <a:rPr lang="en-US" sz="1500" dirty="0"/>
+                        <a:rPr lang="en-US" sz="1500"/>
                         <a:t>-311.019501502</a:t>
                       </a:r>
                     </a:p>
@@ -5359,7 +5359,7 @@
                     <a:lstStyle/>
                     <a:p>
                       <a:r>
-                        <a:rPr lang="en-US" sz="1500" dirty="0">
+                        <a:rPr lang="en-US" sz="1500">
                           <a:solidFill>
                             <a:schemeClr val="accent1"/>
                           </a:solidFill>
@@ -5396,7 +5396,7 @@
                     <a:lstStyle/>
                     <a:p>
                       <a:r>
-                        <a:rPr lang="en-US" sz="1500" dirty="0">
+                        <a:rPr lang="en-US" sz="1500">
                           <a:solidFill>
                             <a:schemeClr val="accent1"/>
                           </a:solidFill>
@@ -5413,7 +5413,7 @@
                     <a:lstStyle/>
                     <a:p>
                       <a:r>
-                        <a:rPr lang="en-US" sz="1500" dirty="0">
+                        <a:rPr lang="en-US" sz="1500">
                           <a:solidFill>
                             <a:schemeClr val="accent6">
                               <a:lumMod val="75000"/>
@@ -5432,7 +5432,7 @@
                     <a:lstStyle/>
                     <a:p>
                       <a:r>
-                        <a:rPr lang="en-US" sz="1500" dirty="0"/>
+                        <a:rPr lang="en-US" sz="1500"/>
                         <a:t>-1167.48954551</a:t>
                       </a:r>
                     </a:p>
@@ -5445,7 +5445,7 @@
                     <a:lstStyle/>
                     <a:p>
                       <a:r>
-                        <a:rPr lang="en-US" sz="1500" dirty="0"/>
+                        <a:rPr lang="en-US" sz="1500"/>
                         <a:t>-311.019473484</a:t>
                       </a:r>
                     </a:p>
@@ -5458,7 +5458,7 @@
                     <a:lstStyle/>
                     <a:p>
                       <a:r>
-                        <a:rPr lang="en-US" sz="1500" dirty="0">
+                        <a:rPr lang="en-US" sz="1500">
                           <a:solidFill>
                             <a:schemeClr val="accent1"/>
                           </a:solidFill>
@@ -5640,20 +5640,20 @@
                         <a:buNone/>
                       </a:pPr>
                       <a:r>
-                        <a:rPr lang="en-US" sz="1400" dirty="0">
+                        <a:rPr lang="en-US" sz="1400">
                           <a:latin typeface="Yu Gothic" panose="020B0400000000000000" pitchFamily="34" charset="-128"/>
                           <a:ea typeface="Yu Gothic" panose="020B0400000000000000" pitchFamily="34" charset="-128"/>
                         </a:rPr>
                         <a:t>B. </a:t>
                       </a:r>
                       <a:r>
-                        <a:rPr lang="en-US" sz="1400" dirty="0" err="1">
+                        <a:rPr lang="en-US" sz="1400" err="1">
                           <a:latin typeface="Yu Gothic" panose="020B0400000000000000" pitchFamily="34" charset="-128"/>
                           <a:ea typeface="Yu Gothic" panose="020B0400000000000000" pitchFamily="34" charset="-128"/>
                         </a:rPr>
                         <a:t>massiliensis</a:t>
                       </a:r>
-                      <a:endParaRPr lang="en-US" sz="1400" dirty="0">
+                      <a:endParaRPr lang="en-US" sz="1400">
                         <a:latin typeface="Yu Gothic" panose="020B0400000000000000" pitchFamily="34" charset="-128"/>
                         <a:ea typeface="Yu Gothic" panose="020B0400000000000000" pitchFamily="34" charset="-128"/>
                       </a:endParaRPr>
@@ -5670,20 +5670,20 @@
                         <a:buNone/>
                       </a:pPr>
                       <a:r>
-                        <a:rPr lang="en-US" sz="1400" dirty="0">
+                        <a:rPr lang="en-US" sz="1400">
                           <a:latin typeface="Yu Gothic" panose="020B0400000000000000" pitchFamily="34" charset="-128"/>
                           <a:ea typeface="Yu Gothic" panose="020B0400000000000000" pitchFamily="34" charset="-128"/>
                         </a:rPr>
                         <a:t>B. </a:t>
                       </a:r>
                       <a:r>
-                        <a:rPr lang="en-US" sz="1400" dirty="0" err="1">
+                        <a:rPr lang="en-US" sz="1400" err="1">
                           <a:latin typeface="Yu Gothic" panose="020B0400000000000000" pitchFamily="34" charset="-128"/>
                           <a:ea typeface="Yu Gothic" panose="020B0400000000000000" pitchFamily="34" charset="-128"/>
                         </a:rPr>
                         <a:t>ovatus</a:t>
                       </a:r>
-                      <a:endParaRPr lang="en-US" sz="1400" dirty="0">
+                      <a:endParaRPr lang="en-US" sz="1400">
                         <a:latin typeface="Yu Gothic" panose="020B0400000000000000" pitchFamily="34" charset="-128"/>
                         <a:ea typeface="Yu Gothic" panose="020B0400000000000000" pitchFamily="34" charset="-128"/>
                       </a:endParaRPr>
@@ -5714,20 +5714,20 @@
                         <a:defRPr/>
                       </a:pPr>
                       <a:r>
-                        <a:rPr lang="en-US" sz="1400" dirty="0">
+                        <a:rPr lang="en-US" sz="1400">
                           <a:latin typeface="Yu Gothic" panose="020B0400000000000000" pitchFamily="34" charset="-128"/>
                           <a:ea typeface="Yu Gothic" panose="020B0400000000000000" pitchFamily="34" charset="-128"/>
                         </a:rPr>
                         <a:t>B. </a:t>
                       </a:r>
                       <a:r>
-                        <a:rPr lang="en-US" sz="1400" dirty="0" err="1">
+                        <a:rPr lang="en-US" sz="1400" err="1">
                           <a:latin typeface="Yu Gothic" panose="020B0400000000000000" pitchFamily="34" charset="-128"/>
                           <a:ea typeface="Yu Gothic" panose="020B0400000000000000" pitchFamily="34" charset="-128"/>
                         </a:rPr>
                         <a:t>stercoris</a:t>
                       </a:r>
-                      <a:endParaRPr lang="en-US" sz="1400" dirty="0">
+                      <a:endParaRPr lang="en-US" sz="1400">
                         <a:latin typeface="Yu Gothic" panose="020B0400000000000000" pitchFamily="34" charset="-128"/>
                         <a:ea typeface="Yu Gothic" panose="020B0400000000000000" pitchFamily="34" charset="-128"/>
                       </a:endParaRPr>
@@ -5758,7 +5758,7 @@
                         <a:defRPr/>
                       </a:pPr>
                       <a:r>
-                        <a:rPr lang="en-US" sz="1400" dirty="0">
+                        <a:rPr lang="en-US" sz="1400">
                           <a:solidFill>
                             <a:schemeClr val="accent1"/>
                           </a:solidFill>
@@ -5768,7 +5768,7 @@
                         <a:t>B. </a:t>
                       </a:r>
                       <a:r>
-                        <a:rPr lang="en-US" sz="1400" dirty="0" err="1">
+                        <a:rPr lang="en-US" sz="1400" err="1">
                           <a:solidFill>
                             <a:schemeClr val="accent1"/>
                           </a:solidFill>
@@ -5777,7 +5777,7 @@
                         </a:rPr>
                         <a:t>thetaiotamicron</a:t>
                       </a:r>
-                      <a:endParaRPr lang="en-US" sz="1400" dirty="0">
+                      <a:endParaRPr lang="en-US" sz="1400">
                         <a:solidFill>
                           <a:schemeClr val="accent1"/>
                         </a:solidFill>
@@ -5797,7 +5797,7 @@
                         <a:buNone/>
                       </a:pPr>
                       <a:r>
-                        <a:rPr lang="en-US" sz="1400" dirty="0">
+                        <a:rPr lang="en-US" sz="1400">
                           <a:solidFill>
                             <a:schemeClr val="bg1"/>
                           </a:solidFill>
@@ -5807,7 +5807,7 @@
                         <a:t>B. </a:t>
                       </a:r>
                       <a:r>
-                        <a:rPr lang="en-US" sz="1400" dirty="0" err="1">
+                        <a:rPr lang="en-US" sz="1400" err="1">
                           <a:solidFill>
                             <a:schemeClr val="bg1"/>
                           </a:solidFill>
@@ -5816,7 +5816,7 @@
                         </a:rPr>
                         <a:t>uniformis</a:t>
                       </a:r>
-                      <a:endParaRPr lang="en-US" sz="1400" dirty="0">
+                      <a:endParaRPr lang="en-US" sz="1400">
                         <a:solidFill>
                           <a:schemeClr val="bg1"/>
                         </a:solidFill>
@@ -5840,7 +5840,7 @@
                     <a:lstStyle/>
                     <a:p>
                       <a:r>
-                        <a:rPr lang="en-US" sz="1400" dirty="0">
+                        <a:rPr lang="en-US" sz="1400">
                           <a:latin typeface="Yu Gothic" panose="020B0400000000000000" pitchFamily="34" charset="-128"/>
                           <a:ea typeface="Yu Gothic" panose="020B0400000000000000" pitchFamily="34" charset="-128"/>
                         </a:rPr>
@@ -5856,7 +5856,7 @@
                     <a:lstStyle/>
                     <a:p>
                       <a:r>
-                        <a:rPr lang="en-US" sz="1400" dirty="0">
+                        <a:rPr lang="en-US" sz="1400">
                           <a:latin typeface="Yu Gothic" panose="020B0400000000000000" pitchFamily="34" charset="-128"/>
                           <a:ea typeface="Yu Gothic" panose="020B0400000000000000" pitchFamily="34" charset="-128"/>
                         </a:rPr>
@@ -5872,7 +5872,7 @@
                     <a:lstStyle/>
                     <a:p>
                       <a:r>
-                        <a:rPr lang="en-US" sz="1400" dirty="0">
+                        <a:rPr lang="en-US" sz="1400">
                           <a:solidFill>
                             <a:schemeClr val="tx1"/>
                           </a:solidFill>
@@ -5891,7 +5891,7 @@
                     <a:lstStyle/>
                     <a:p>
                       <a:r>
-                        <a:rPr lang="en-US" sz="1400" dirty="0">
+                        <a:rPr lang="en-US" sz="1400">
                           <a:latin typeface="Yu Gothic" panose="020B0400000000000000" pitchFamily="34" charset="-128"/>
                           <a:ea typeface="Yu Gothic" panose="020B0400000000000000" pitchFamily="34" charset="-128"/>
                         </a:rPr>
@@ -5907,7 +5907,7 @@
                     <a:lstStyle/>
                     <a:p>
                       <a:r>
-                        <a:rPr lang="en-US" sz="1400" dirty="0">
+                        <a:rPr lang="en-US" sz="1400">
                           <a:solidFill>
                             <a:schemeClr val="accent1"/>
                           </a:solidFill>
@@ -5926,7 +5926,7 @@
                     <a:lstStyle/>
                     <a:p>
                       <a:r>
-                        <a:rPr lang="en-US" sz="1400" dirty="0">
+                        <a:rPr lang="en-US" sz="1400">
                           <a:solidFill>
                             <a:schemeClr val="tx1"/>
                           </a:solidFill>
@@ -5968,7 +5968,7 @@
                     <a:lstStyle/>
                     <a:p>
                       <a:r>
-                        <a:rPr lang="en-US" sz="1400" dirty="0">
+                        <a:rPr lang="en-US" sz="1400">
                           <a:latin typeface="Yu Gothic" panose="020B0400000000000000" pitchFamily="34" charset="-128"/>
                           <a:ea typeface="Yu Gothic" panose="020B0400000000000000" pitchFamily="34" charset="-128"/>
                         </a:rPr>
@@ -5984,7 +5984,7 @@
                     <a:lstStyle/>
                     <a:p>
                       <a:r>
-                        <a:rPr lang="en-US" sz="1400" dirty="0">
+                        <a:rPr lang="en-US" sz="1400">
                           <a:solidFill>
                             <a:schemeClr val="tx1"/>
                           </a:solidFill>
@@ -6003,7 +6003,7 @@
                     <a:lstStyle/>
                     <a:p>
                       <a:r>
-                        <a:rPr lang="en-US" sz="1400" dirty="0">
+                        <a:rPr lang="en-US" sz="1400">
                           <a:latin typeface="Yu Gothic" panose="020B0400000000000000" pitchFamily="34" charset="-128"/>
                           <a:ea typeface="Yu Gothic" panose="020B0400000000000000" pitchFamily="34" charset="-128"/>
                         </a:rPr>
@@ -6019,7 +6019,7 @@
                     <a:lstStyle/>
                     <a:p>
                       <a:r>
-                        <a:rPr lang="en-US" sz="1400" dirty="0">
+                        <a:rPr lang="en-US" sz="1400">
                           <a:solidFill>
                             <a:schemeClr val="accent1"/>
                           </a:solidFill>
@@ -6038,7 +6038,7 @@
                     <a:lstStyle/>
                     <a:p>
                       <a:r>
-                        <a:rPr lang="en-US" sz="1400" dirty="0">
+                        <a:rPr lang="en-US" sz="1400">
                           <a:solidFill>
                             <a:schemeClr val="tx1"/>
                           </a:solidFill>
@@ -6158,20 +6158,20 @@
                         <a:buNone/>
                       </a:pPr>
                       <a:r>
-                        <a:rPr lang="en-US" sz="1400" dirty="0">
+                        <a:rPr lang="en-US" sz="1400">
                           <a:latin typeface="Yu Gothic" panose="020B0400000000000000" pitchFamily="34" charset="-128"/>
                           <a:ea typeface="Yu Gothic" panose="020B0400000000000000" pitchFamily="34" charset="-128"/>
                         </a:rPr>
                         <a:t>B. </a:t>
                       </a:r>
                       <a:r>
-                        <a:rPr lang="en-US" sz="1400" dirty="0" err="1">
+                        <a:rPr lang="en-US" sz="1400" err="1">
                           <a:latin typeface="Yu Gothic" panose="020B0400000000000000" pitchFamily="34" charset="-128"/>
                           <a:ea typeface="Yu Gothic" panose="020B0400000000000000" pitchFamily="34" charset="-128"/>
                         </a:rPr>
                         <a:t>vulgatus</a:t>
                       </a:r>
-                      <a:endParaRPr lang="en-US" sz="1400" dirty="0">
+                      <a:endParaRPr lang="en-US" sz="1400">
                         <a:latin typeface="Yu Gothic" panose="020B0400000000000000" pitchFamily="34" charset="-128"/>
                         <a:ea typeface="Yu Gothic" panose="020B0400000000000000" pitchFamily="34" charset="-128"/>
                       </a:endParaRPr>
@@ -6188,14 +6188,14 @@
                         <a:buNone/>
                       </a:pPr>
                       <a:r>
-                        <a:rPr lang="en-US" sz="1500" dirty="0"/>
+                        <a:rPr lang="en-US" sz="1500"/>
                         <a:t>B. </a:t>
                       </a:r>
                       <a:r>
-                        <a:rPr lang="en-US" sz="1500" dirty="0" err="1"/>
+                        <a:rPr lang="en-US" sz="1500" err="1"/>
                         <a:t>xylanisolvens</a:t>
                       </a:r>
-                      <a:endParaRPr lang="en-US" sz="1500" dirty="0"/>
+                      <a:endParaRPr lang="en-US" sz="1500"/>
                     </a:p>
                   </a:txBody>
                   <a:tcPr/>
@@ -6209,32 +6209,32 @@
                         <a:buNone/>
                       </a:pPr>
                       <a:r>
-                        <a:rPr lang="en-US" sz="1500" dirty="0"/>
+                        <a:rPr lang="en-US" sz="1500"/>
                         <a:t>D. </a:t>
                       </a:r>
                       <a:r>
-                        <a:rPr lang="en-US" sz="1500" dirty="0" err="1"/>
+                        <a:rPr lang="en-US" sz="1500" err="1"/>
                         <a:t>invisus</a:t>
                       </a:r>
-                      <a:endParaRPr lang="en-US" sz="1500" dirty="0"/>
-                    </a:p>
-                  </a:txBody>
-                  <a:tcPr/>
-                </a:tc>
-                <a:tc>
-                  <a:txBody>
-                    <a:bodyPr/>
-                    <a:lstStyle/>
-                    <a:p>
-                      <a:r>
-                        <a:rPr lang="en-US" sz="1500" dirty="0"/>
+                      <a:endParaRPr lang="en-US" sz="1500"/>
+                    </a:p>
+                  </a:txBody>
+                  <a:tcPr/>
+                </a:tc>
+                <a:tc>
+                  <a:txBody>
+                    <a:bodyPr/>
+                    <a:lstStyle/>
+                    <a:p>
+                      <a:r>
+                        <a:rPr lang="en-US" sz="1500"/>
                         <a:t>E. </a:t>
                       </a:r>
                       <a:r>
-                        <a:rPr lang="en-US" sz="1500" dirty="0" err="1"/>
+                        <a:rPr lang="en-US" sz="1500" err="1"/>
                         <a:t>eligens</a:t>
                       </a:r>
-                      <a:endParaRPr lang="en-US" sz="1500" dirty="0"/>
+                      <a:endParaRPr lang="en-US" sz="1500"/>
                     </a:p>
                   </a:txBody>
                   <a:tcPr/>
@@ -6248,20 +6248,20 @@
                         <a:buNone/>
                       </a:pPr>
                       <a:r>
-                        <a:rPr lang="en-US" sz="1400" dirty="0">
+                        <a:rPr lang="en-US" sz="1400">
                           <a:latin typeface="Yu Gothic" panose="020B0400000000000000" pitchFamily="34" charset="-128"/>
                           <a:ea typeface="Yu Gothic" panose="020B0400000000000000" pitchFamily="34" charset="-128"/>
                         </a:rPr>
                         <a:t>E. </a:t>
                       </a:r>
                       <a:r>
-                        <a:rPr lang="en-US" sz="1400" dirty="0" err="1">
+                        <a:rPr lang="en-US" sz="1400" err="1">
                           <a:latin typeface="Yu Gothic" panose="020B0400000000000000" pitchFamily="34" charset="-128"/>
                           <a:ea typeface="Yu Gothic" panose="020B0400000000000000" pitchFamily="34" charset="-128"/>
                         </a:rPr>
                         <a:t>rectale</a:t>
                       </a:r>
-                      <a:endParaRPr lang="en-US" sz="1400" dirty="0">
+                      <a:endParaRPr lang="en-US" sz="1400">
                         <a:latin typeface="Yu Gothic" panose="020B0400000000000000" pitchFamily="34" charset="-128"/>
                         <a:ea typeface="Yu Gothic" panose="020B0400000000000000" pitchFamily="34" charset="-128"/>
                       </a:endParaRPr>
@@ -6282,7 +6282,7 @@
                     <a:lstStyle/>
                     <a:p>
                       <a:r>
-                        <a:rPr lang="en-US" sz="1500" dirty="0"/>
+                        <a:rPr lang="en-US" sz="1500"/>
                         <a:t>Multiple Epochs</a:t>
                       </a:r>
                     </a:p>
@@ -6295,7 +6295,7 @@
                     <a:lstStyle/>
                     <a:p>
                       <a:r>
-                        <a:rPr lang="en-US" sz="1400" dirty="0">
+                        <a:rPr lang="en-US" sz="1400">
                           <a:latin typeface="Yu Gothic" panose="020B0400000000000000" pitchFamily="34" charset="-128"/>
                           <a:ea typeface="Yu Gothic" panose="020B0400000000000000" pitchFamily="34" charset="-128"/>
                         </a:rPr>
@@ -6311,7 +6311,7 @@
                     <a:lstStyle/>
                     <a:p>
                       <a:r>
-                        <a:rPr lang="en-US" sz="1500" dirty="0"/>
+                        <a:rPr lang="en-US" sz="1500"/>
                         <a:t>-166.0628826</a:t>
                       </a:r>
                     </a:p>
@@ -6324,7 +6324,7 @@
                     <a:lstStyle/>
                     <a:p>
                       <a:r>
-                        <a:rPr lang="en-US" sz="1500" dirty="0"/>
+                        <a:rPr lang="en-US" sz="1500"/>
                         <a:t>-140.340722705</a:t>
                       </a:r>
                     </a:p>
@@ -6337,7 +6337,7 @@
                     <a:lstStyle/>
                     <a:p>
                       <a:r>
-                        <a:rPr lang="en-US" sz="1500" dirty="0"/>
+                        <a:rPr lang="en-US" sz="1500"/>
                         <a:t>-226.737990541</a:t>
                       </a:r>
                     </a:p>
@@ -6350,7 +6350,7 @@
                     <a:lstStyle/>
                     <a:p>
                       <a:r>
-                        <a:rPr lang="en-US" sz="1400" dirty="0">
+                        <a:rPr lang="en-US" sz="1400">
                           <a:latin typeface="Yu Gothic" panose="020B0400000000000000" pitchFamily="34" charset="-128"/>
                           <a:ea typeface="Yu Gothic" panose="020B0400000000000000" pitchFamily="34" charset="-128"/>
                         </a:rPr>
@@ -6386,7 +6386,7 @@
                     <a:lstStyle/>
                     <a:p>
                       <a:r>
-                        <a:rPr lang="en-US" sz="1400" dirty="0">
+                        <a:rPr lang="en-US" sz="1400">
                           <a:latin typeface="Yu Gothic" panose="020B0400000000000000" pitchFamily="34" charset="-128"/>
                           <a:ea typeface="Yu Gothic" panose="020B0400000000000000" pitchFamily="34" charset="-128"/>
                         </a:rPr>
@@ -6402,7 +6402,7 @@
                     <a:lstStyle/>
                     <a:p>
                       <a:r>
-                        <a:rPr lang="en-US" sz="1500" dirty="0"/>
+                        <a:rPr lang="en-US" sz="1500"/>
                         <a:t>-166.062883792</a:t>
                       </a:r>
                     </a:p>
@@ -6415,7 +6415,7 @@
                     <a:lstStyle/>
                     <a:p>
                       <a:r>
-                        <a:rPr lang="en-US" sz="1500" dirty="0"/>
+                        <a:rPr lang="en-US" sz="1500"/>
                         <a:t>-140.340721113</a:t>
                       </a:r>
                     </a:p>
@@ -6428,7 +6428,7 @@
                     <a:lstStyle/>
                     <a:p>
                       <a:r>
-                        <a:rPr lang="en-US" sz="1500" dirty="0"/>
+                        <a:rPr lang="en-US" sz="1500"/>
                         <a:t>-226.737989406</a:t>
                       </a:r>
                     </a:p>
@@ -6441,7 +6441,7 @@
                     <a:lstStyle/>
                     <a:p>
                       <a:r>
-                        <a:rPr lang="en-US" sz="1400" dirty="0">
+                        <a:rPr lang="en-US" sz="1400">
                           <a:latin typeface="Yu Gothic" panose="020B0400000000000000" pitchFamily="34" charset="-128"/>
                           <a:ea typeface="Yu Gothic" panose="020B0400000000000000" pitchFamily="34" charset="-128"/>
                         </a:rPr>
@@ -6622,20 +6622,20 @@
                         <a:buNone/>
                       </a:pPr>
                       <a:r>
-                        <a:rPr lang="en-US" sz="1400" dirty="0">
+                        <a:rPr lang="en-US" sz="1400">
                           <a:latin typeface="Yu Gothic" panose="020B0400000000000000" pitchFamily="34" charset="-128"/>
                           <a:ea typeface="Yu Gothic" panose="020B0400000000000000" pitchFamily="34" charset="-128"/>
                         </a:rPr>
                         <a:t>F. </a:t>
                       </a:r>
                       <a:r>
-                        <a:rPr lang="en-US" sz="1400" dirty="0" err="1">
+                        <a:rPr lang="en-US" sz="1400" err="1">
                           <a:latin typeface="Yu Gothic" panose="020B0400000000000000" pitchFamily="34" charset="-128"/>
                           <a:ea typeface="Yu Gothic" panose="020B0400000000000000" pitchFamily="34" charset="-128"/>
                         </a:rPr>
                         <a:t>prausnitzii</a:t>
                       </a:r>
-                      <a:endParaRPr lang="en-US" sz="1400" dirty="0">
+                      <a:endParaRPr lang="en-US" sz="1400">
                         <a:latin typeface="Yu Gothic" panose="020B0400000000000000" pitchFamily="34" charset="-128"/>
                         <a:ea typeface="Yu Gothic" panose="020B0400000000000000" pitchFamily="34" charset="-128"/>
                       </a:endParaRPr>
@@ -6652,7 +6652,7 @@
                         <a:buNone/>
                       </a:pPr>
                       <a:r>
-                        <a:rPr lang="en-US" sz="1400" dirty="0">
+                        <a:rPr lang="en-US" sz="1400">
                           <a:solidFill>
                             <a:schemeClr val="bg1"/>
                           </a:solidFill>
@@ -6662,7 +6662,7 @@
                         <a:t>O. </a:t>
                       </a:r>
                       <a:r>
-                        <a:rPr lang="en-US" sz="1400" dirty="0" err="1">
+                        <a:rPr lang="en-US" sz="1400" err="1">
                           <a:solidFill>
                             <a:schemeClr val="bg1"/>
                           </a:solidFill>
@@ -6671,7 +6671,7 @@
                         </a:rPr>
                         <a:t>sp</a:t>
                       </a:r>
-                      <a:endParaRPr lang="en-US" sz="1400" dirty="0">
+                      <a:endParaRPr lang="en-US" sz="1400">
                         <a:solidFill>
                           <a:schemeClr val="bg1"/>
                         </a:solidFill>
@@ -6705,7 +6705,7 @@
                         <a:defRPr/>
                       </a:pPr>
                       <a:r>
-                        <a:rPr lang="en-US" sz="1400" dirty="0">
+                        <a:rPr lang="en-US" sz="1400">
                           <a:solidFill>
                             <a:schemeClr val="bg1"/>
                           </a:solidFill>
@@ -6715,7 +6715,7 @@
                         <a:t>P. </a:t>
                       </a:r>
                       <a:r>
-                        <a:rPr lang="en-US" sz="1400" dirty="0" err="1">
+                        <a:rPr lang="en-US" sz="1400" err="1">
                           <a:solidFill>
                             <a:schemeClr val="bg1"/>
                           </a:solidFill>
@@ -6724,7 +6724,7 @@
                         </a:rPr>
                         <a:t>copri</a:t>
                       </a:r>
-                      <a:endParaRPr lang="en-US" sz="1400" dirty="0">
+                      <a:endParaRPr lang="en-US" sz="1400">
                         <a:solidFill>
                           <a:schemeClr val="bg1"/>
                         </a:solidFill>
@@ -6744,7 +6744,7 @@
                         <a:buNone/>
                       </a:pPr>
                       <a:r>
-                        <a:rPr lang="en-US" sz="1400" dirty="0">
+                        <a:rPr lang="en-US" sz="1400">
                           <a:solidFill>
                             <a:schemeClr val="accent1"/>
                           </a:solidFill>
@@ -6754,7 +6754,7 @@
                         <a:t>P. </a:t>
                       </a:r>
                       <a:r>
-                        <a:rPr lang="en-US" sz="1400" dirty="0" err="1">
+                        <a:rPr lang="en-US" sz="1400" err="1">
                           <a:solidFill>
                             <a:schemeClr val="accent1"/>
                           </a:solidFill>
@@ -6763,7 +6763,7 @@
                         </a:rPr>
                         <a:t>distasonis</a:t>
                       </a:r>
-                      <a:endParaRPr lang="en-US" sz="1400" dirty="0">
+                      <a:endParaRPr lang="en-US" sz="1400">
                         <a:solidFill>
                           <a:schemeClr val="accent1"/>
                         </a:solidFill>
@@ -6797,7 +6797,7 @@
                         <a:defRPr/>
                       </a:pPr>
                       <a:r>
-                        <a:rPr lang="en-US" sz="1400" dirty="0">
+                        <a:rPr lang="en-US" sz="1400">
                           <a:solidFill>
                             <a:schemeClr val="accent1"/>
                           </a:solidFill>
@@ -6807,7 +6807,7 @@
                         <a:t>P. </a:t>
                       </a:r>
                       <a:r>
-                        <a:rPr lang="en-US" sz="1400" dirty="0" err="1">
+                        <a:rPr lang="en-US" sz="1400" err="1">
                           <a:solidFill>
                             <a:schemeClr val="accent1"/>
                           </a:solidFill>
@@ -6816,7 +6816,7 @@
                         </a:rPr>
                         <a:t>merdae</a:t>
                       </a:r>
-                      <a:endParaRPr lang="en-US" sz="1400" dirty="0">
+                      <a:endParaRPr lang="en-US" sz="1400">
                         <a:solidFill>
                           <a:schemeClr val="accent1"/>
                         </a:solidFill>
@@ -6840,7 +6840,7 @@
                     <a:lstStyle/>
                     <a:p>
                       <a:r>
-                        <a:rPr lang="en-US" sz="1400" dirty="0">
+                        <a:rPr lang="en-US" sz="1400">
                           <a:latin typeface="Yu Gothic" panose="020B0400000000000000" pitchFamily="34" charset="-128"/>
                           <a:ea typeface="Yu Gothic" panose="020B0400000000000000" pitchFamily="34" charset="-128"/>
                         </a:rPr>
@@ -6856,7 +6856,7 @@
                     <a:lstStyle/>
                     <a:p>
                       <a:r>
-                        <a:rPr lang="en-US" sz="1400" dirty="0">
+                        <a:rPr lang="en-US" sz="1400">
                           <a:latin typeface="Yu Gothic" panose="020B0400000000000000" pitchFamily="34" charset="-128"/>
                           <a:ea typeface="Yu Gothic" panose="020B0400000000000000" pitchFamily="34" charset="-128"/>
                         </a:rPr>
@@ -6872,7 +6872,7 @@
                     <a:lstStyle/>
                     <a:p>
                       <a:r>
-                        <a:rPr lang="en-US" sz="1400" dirty="0">
+                        <a:rPr lang="en-US" sz="1400">
                           <a:solidFill>
                             <a:schemeClr val="tx1"/>
                           </a:solidFill>
@@ -6891,7 +6891,7 @@
                     <a:lstStyle/>
                     <a:p>
                       <a:r>
-                        <a:rPr lang="en-US" sz="1400" dirty="0">
+                        <a:rPr lang="en-US" sz="1400">
                           <a:solidFill>
                             <a:schemeClr val="tx1"/>
                           </a:solidFill>
@@ -6910,7 +6910,7 @@
                     <a:lstStyle/>
                     <a:p>
                       <a:r>
-                        <a:rPr lang="en-US" sz="1400" dirty="0">
+                        <a:rPr lang="en-US" sz="1400">
                           <a:solidFill>
                             <a:schemeClr val="accent1"/>
                           </a:solidFill>
@@ -6929,7 +6929,7 @@
                     <a:lstStyle/>
                     <a:p>
                       <a:r>
-                        <a:rPr lang="en-US" sz="1400" dirty="0">
+                        <a:rPr lang="en-US" sz="1400">
                           <a:solidFill>
                             <a:schemeClr val="accent1"/>
                           </a:solidFill>
@@ -6971,7 +6971,7 @@
                     <a:lstStyle/>
                     <a:p>
                       <a:r>
-                        <a:rPr lang="en-US" sz="1400" dirty="0">
+                        <a:rPr lang="en-US" sz="1400">
                           <a:latin typeface="Yu Gothic" panose="020B0400000000000000" pitchFamily="34" charset="-128"/>
                           <a:ea typeface="Yu Gothic" panose="020B0400000000000000" pitchFamily="34" charset="-128"/>
                         </a:rPr>
@@ -6987,7 +6987,7 @@
                     <a:lstStyle/>
                     <a:p>
                       <a:r>
-                        <a:rPr lang="en-US" sz="1400" dirty="0">
+                        <a:rPr lang="en-US" sz="1400">
                           <a:solidFill>
                             <a:schemeClr val="tx1"/>
                           </a:solidFill>
@@ -7006,7 +7006,7 @@
                     <a:lstStyle/>
                     <a:p>
                       <a:r>
-                        <a:rPr lang="en-US" sz="1400" dirty="0">
+                        <a:rPr lang="en-US" sz="1400">
                           <a:solidFill>
                             <a:schemeClr val="tx1"/>
                           </a:solidFill>
@@ -7025,7 +7025,7 @@
                     <a:lstStyle/>
                     <a:p>
                       <a:r>
-                        <a:rPr lang="en-US" sz="1400" dirty="0">
+                        <a:rPr lang="en-US" sz="1400">
                           <a:solidFill>
                             <a:schemeClr val="accent1"/>
                           </a:solidFill>
@@ -7044,7 +7044,7 @@
                     <a:lstStyle/>
                     <a:p>
                       <a:r>
-                        <a:rPr lang="en-US" sz="1400" dirty="0">
+                        <a:rPr lang="en-US" sz="1400">
                           <a:solidFill>
                             <a:schemeClr val="accent1"/>
                           </a:solidFill>
@@ -7164,7 +7164,7 @@
                         <a:buNone/>
                       </a:pPr>
                       <a:r>
-                        <a:rPr lang="en-US" sz="1500" dirty="0">
+                        <a:rPr lang="en-US" sz="1500">
                           <a:solidFill>
                             <a:schemeClr val="accent1"/>
                           </a:solidFill>
@@ -7172,14 +7172,14 @@
                         <a:t>P. </a:t>
                       </a:r>
                       <a:r>
-                        <a:rPr lang="en-US" sz="1500" dirty="0" err="1">
+                        <a:rPr lang="en-US" sz="1500" err="1">
                           <a:solidFill>
                             <a:schemeClr val="accent1"/>
                           </a:solidFill>
                         </a:rPr>
                         <a:t>sp</a:t>
                       </a:r>
-                      <a:endParaRPr lang="en-US" sz="1500" dirty="0">
+                      <a:endParaRPr lang="en-US" sz="1500">
                         <a:solidFill>
                           <a:schemeClr val="accent1"/>
                         </a:solidFill>
@@ -7197,14 +7197,14 @@
                         <a:buNone/>
                       </a:pPr>
                       <a:r>
-                        <a:rPr lang="en-US" sz="1500" dirty="0"/>
+                        <a:rPr lang="en-US" sz="1500"/>
                         <a:t>R. </a:t>
                       </a:r>
                       <a:r>
-                        <a:rPr lang="en-US" sz="1500" dirty="0" err="1"/>
+                        <a:rPr lang="en-US" sz="1500" err="1"/>
                         <a:t>bromii</a:t>
                       </a:r>
-                      <a:endParaRPr lang="en-US" sz="1500" dirty="0"/>
+                      <a:endParaRPr lang="en-US" sz="1500"/>
                     </a:p>
                   </a:txBody>
                   <a:tcPr/>
@@ -7217,7 +7217,7 @@
                       <a:pPr marL="0" indent="0">
                         <a:buNone/>
                       </a:pPr>
-                      <a:endParaRPr lang="en-US" sz="1500" dirty="0"/>
+                      <a:endParaRPr lang="en-US" sz="1500"/>
                     </a:p>
                   </a:txBody>
                   <a:tcPr/>
@@ -7230,17 +7230,17 @@
                       <a:pPr marL="0" indent="0">
                         <a:buNone/>
                       </a:pPr>
-                      <a:endParaRPr lang="en-US" sz="1500" dirty="0"/>
-                    </a:p>
-                  </a:txBody>
-                  <a:tcPr/>
-                </a:tc>
-                <a:tc>
-                  <a:txBody>
-                    <a:bodyPr/>
-                    <a:lstStyle/>
-                    <a:p>
-                      <a:endParaRPr lang="en-US" sz="1500" dirty="0"/>
+                      <a:endParaRPr lang="en-US" sz="1500"/>
+                    </a:p>
+                  </a:txBody>
+                  <a:tcPr/>
+                </a:tc>
+                <a:tc>
+                  <a:txBody>
+                    <a:bodyPr/>
+                    <a:lstStyle/>
+                    <a:p>
+                      <a:endParaRPr lang="en-US" sz="1500"/>
                     </a:p>
                   </a:txBody>
                   <a:tcPr/>
@@ -7258,7 +7258,7 @@
                     <a:lstStyle/>
                     <a:p>
                       <a:r>
-                        <a:rPr lang="en-US" sz="1500" dirty="0"/>
+                        <a:rPr lang="en-US" sz="1500"/>
                         <a:t>Multiple Epochs</a:t>
                       </a:r>
                     </a:p>
@@ -7271,7 +7271,7 @@
                     <a:lstStyle/>
                     <a:p>
                       <a:r>
-                        <a:rPr lang="en-US" sz="1500" dirty="0">
+                        <a:rPr lang="en-US" sz="1500">
                           <a:solidFill>
                             <a:schemeClr val="accent1"/>
                           </a:solidFill>
@@ -7288,7 +7288,7 @@
                     <a:lstStyle/>
                     <a:p>
                       <a:r>
-                        <a:rPr lang="en-US" sz="1500" dirty="0"/>
+                        <a:rPr lang="en-US" sz="1500"/>
                         <a:t>-569.361933978</a:t>
                       </a:r>
                     </a:p>
@@ -7300,27 +7300,27 @@
                     <a:bodyPr/>
                     <a:lstStyle/>
                     <a:p>
-                      <a:endParaRPr lang="en-US" sz="1500" dirty="0"/>
-                    </a:p>
-                  </a:txBody>
-                  <a:tcPr/>
-                </a:tc>
-                <a:tc>
-                  <a:txBody>
-                    <a:bodyPr/>
-                    <a:lstStyle/>
-                    <a:p>
-                      <a:endParaRPr lang="en-US" sz="1500" dirty="0"/>
-                    </a:p>
-                  </a:txBody>
-                  <a:tcPr/>
-                </a:tc>
-                <a:tc>
-                  <a:txBody>
-                    <a:bodyPr/>
-                    <a:lstStyle/>
-                    <a:p>
-                      <a:endParaRPr lang="en-US" sz="1500" dirty="0"/>
+                      <a:endParaRPr lang="en-US" sz="1500"/>
+                    </a:p>
+                  </a:txBody>
+                  <a:tcPr/>
+                </a:tc>
+                <a:tc>
+                  <a:txBody>
+                    <a:bodyPr/>
+                    <a:lstStyle/>
+                    <a:p>
+                      <a:endParaRPr lang="en-US" sz="1500"/>
+                    </a:p>
+                  </a:txBody>
+                  <a:tcPr/>
+                </a:tc>
+                <a:tc>
+                  <a:txBody>
+                    <a:bodyPr/>
+                    <a:lstStyle/>
+                    <a:p>
+                      <a:endParaRPr lang="en-US" sz="1500"/>
                     </a:p>
                   </a:txBody>
                   <a:tcPr/>
@@ -7351,7 +7351,7 @@
                     <a:lstStyle/>
                     <a:p>
                       <a:r>
-                        <a:rPr lang="en-US" sz="1500" dirty="0">
+                        <a:rPr lang="en-US" sz="1500">
                           <a:solidFill>
                             <a:schemeClr val="accent1"/>
                           </a:solidFill>
@@ -7368,7 +7368,7 @@
                     <a:lstStyle/>
                     <a:p>
                       <a:r>
-                        <a:rPr lang="en-US" sz="1500" dirty="0"/>
+                        <a:rPr lang="en-US" sz="1500"/>
                         <a:t>-569.361932584</a:t>
                       </a:r>
                     </a:p>
@@ -7380,27 +7380,27 @@
                     <a:bodyPr/>
                     <a:lstStyle/>
                     <a:p>
-                      <a:endParaRPr lang="en-US" sz="1500" dirty="0"/>
-                    </a:p>
-                  </a:txBody>
-                  <a:tcPr/>
-                </a:tc>
-                <a:tc>
-                  <a:txBody>
-                    <a:bodyPr/>
-                    <a:lstStyle/>
-                    <a:p>
-                      <a:endParaRPr lang="en-US" sz="1500" dirty="0"/>
-                    </a:p>
-                  </a:txBody>
-                  <a:tcPr/>
-                </a:tc>
-                <a:tc>
-                  <a:txBody>
-                    <a:bodyPr/>
-                    <a:lstStyle/>
-                    <a:p>
-                      <a:endParaRPr lang="en-US" sz="1500" dirty="0"/>
+                      <a:endParaRPr lang="en-US" sz="1500"/>
+                    </a:p>
+                  </a:txBody>
+                  <a:tcPr/>
+                </a:tc>
+                <a:tc>
+                  <a:txBody>
+                    <a:bodyPr/>
+                    <a:lstStyle/>
+                    <a:p>
+                      <a:endParaRPr lang="en-US" sz="1500"/>
+                    </a:p>
+                  </a:txBody>
+                  <a:tcPr/>
+                </a:tc>
+                <a:tc>
+                  <a:txBody>
+                    <a:bodyPr/>
+                    <a:lstStyle/>
+                    <a:p>
+                      <a:endParaRPr lang="en-US" sz="1500"/>
                     </a:p>
                   </a:txBody>
                   <a:tcPr/>
@@ -7467,14 +7467,14 @@
           <a:lstStyle/>
           <a:p>
             <a:r>
-              <a:rPr lang="en-US" dirty="0"/>
+              <a:rPr lang="en-US"/>
               <a:t>A. </a:t>
             </a:r>
             <a:r>
-              <a:rPr lang="en-US" dirty="0" err="1"/>
+              <a:rPr lang="en-US" err="1"/>
               <a:t>finegoldii</a:t>
             </a:r>
-            <a:endParaRPr lang="en-US" dirty="0"/>
+            <a:endParaRPr lang="en-US"/>
           </a:p>
         </p:txBody>
       </p:sp>
@@ -7605,14 +7605,14 @@
           <a:lstStyle/>
           <a:p>
             <a:r>
-              <a:rPr lang="en-US" dirty="0"/>
+              <a:rPr lang="en-US"/>
               <a:t>A. </a:t>
             </a:r>
             <a:r>
-              <a:rPr lang="en-US" dirty="0" err="1"/>
+              <a:rPr lang="en-US" err="1"/>
               <a:t>muciniphila</a:t>
             </a:r>
-            <a:endParaRPr lang="en-US" dirty="0"/>
+            <a:endParaRPr lang="en-US"/>
           </a:p>
         </p:txBody>
       </p:sp>
@@ -7697,23 +7697,23 @@
           <a:lstStyle/>
           <a:p>
             <a:r>
-              <a:rPr lang="en-US" dirty="0"/>
+              <a:rPr lang="en-US"/>
               <a:t>A. </a:t>
             </a:r>
             <a:r>
-              <a:rPr lang="en-US" dirty="0" err="1"/>
+              <a:rPr lang="en-US" err="1"/>
               <a:t>putredinis</a:t>
             </a:r>
             <a:r>
-              <a:rPr lang="en-US" dirty="0"/>
+              <a:rPr lang="en-US"/>
               <a:t> (</a:t>
             </a:r>
             <a:r>
-              <a:rPr lang="en-US" dirty="0" err="1"/>
+              <a:rPr lang="en-US" err="1"/>
               <a:t>sfs</a:t>
             </a:r>
             <a:r>
-              <a:rPr lang="en-US" dirty="0"/>
+              <a:rPr lang="en-US"/>
               <a:t> and likelihood are the same)</a:t>
             </a:r>
           </a:p>

</xml_diff>